<commit_message>
added DDL1, first datamodel and notes
//TODO:
update statement to correct data and add events and results
</commit_message>
<xml_diff>
--- a/Going the distance/goingTheDistance.pptx
+++ b/Going the distance/goingTheDistance.pptx
@@ -9,9 +9,9 @@
   </p:notesMasterIdLst>
   <p:sldIdLst>
     <p:sldId id="256" r:id="rId2"/>
-    <p:sldId id="257" r:id="rId3"/>
-    <p:sldId id="305" r:id="rId4"/>
-    <p:sldId id="306" r:id="rId5"/>
+    <p:sldId id="305" r:id="rId3"/>
+    <p:sldId id="306" r:id="rId4"/>
+    <p:sldId id="257" r:id="rId5"/>
     <p:sldId id="307" r:id="rId6"/>
     <p:sldId id="308" r:id="rId7"/>
     <p:sldId id="309" r:id="rId8"/>
@@ -828,7 +828,7 @@
     </p:spTree>
     <p:extLst>
       <p:ext uri="{BB962C8B-B14F-4D97-AF65-F5344CB8AC3E}">
-        <p14:creationId xmlns:p14="http://schemas.microsoft.com/office/powerpoint/2010/main" val="839644279"/>
+        <p14:creationId xmlns:p14="http://schemas.microsoft.com/office/powerpoint/2010/main" val="1649578170"/>
       </p:ext>
     </p:extLst>
   </p:cSld>
@@ -912,7 +912,7 @@
     </p:spTree>
     <p:extLst>
       <p:ext uri="{BB962C8B-B14F-4D97-AF65-F5344CB8AC3E}">
-        <p14:creationId xmlns:p14="http://schemas.microsoft.com/office/powerpoint/2010/main" val="1649578170"/>
+        <p14:creationId xmlns:p14="http://schemas.microsoft.com/office/powerpoint/2010/main" val="962124579"/>
       </p:ext>
     </p:extLst>
   </p:cSld>
@@ -966,6 +966,33 @@
           <a:bodyPr/>
           <a:lstStyle/>
           <a:p>
+            <a:r>
+              <a:rPr lang="nl-NL" dirty="0"/>
+              <a:t>Going the distance. Finish through all rounds.</a:t>
+            </a:r>
+          </a:p>
+          <a:p>
+            <a:r>
+              <a:rPr lang="nl-NL" dirty="0"/>
+              <a:t>Apex is a mature framework. Marathons</a:t>
+            </a:r>
+          </a:p>
+          <a:p>
+            <a:r>
+              <a:rPr lang="nl-NL" dirty="0"/>
+              <a:t>Apex team has a clear vision and has proved to follow trough on that vision.</a:t>
+            </a:r>
+          </a:p>
+          <a:p>
+            <a:r>
+              <a:rPr lang="nl-NL" dirty="0"/>
+              <a:t>You only need a webbrowser for basic Apex development.</a:t>
+            </a:r>
+          </a:p>
+          <a:p>
+            <a:endParaRPr lang="nl-NL" dirty="0"/>
+          </a:p>
+          <a:p>
             <a:endParaRPr lang="nl-NL" dirty="0"/>
           </a:p>
         </p:txBody>
@@ -996,7 +1023,7 @@
     </p:spTree>
     <p:extLst>
       <p:ext uri="{BB962C8B-B14F-4D97-AF65-F5344CB8AC3E}">
-        <p14:creationId xmlns:p14="http://schemas.microsoft.com/office/powerpoint/2010/main" val="962124579"/>
+        <p14:creationId xmlns:p14="http://schemas.microsoft.com/office/powerpoint/2010/main" val="839644279"/>
       </p:ext>
     </p:extLst>
   </p:cSld>
@@ -3628,7 +3655,7 @@
           <a:p>
             <a:r>
               <a:rPr lang="nl-NL" dirty="0"/>
-              <a:t>Paramaribo, mei 2019</a:t>
+              <a:t>Paramaribo, dec 2019</a:t>
             </a:r>
           </a:p>
         </p:txBody>
@@ -4085,186 +4112,6 @@
             <p:ph type="title"/>
           </p:nvPr>
         </p:nvSpPr>
-        <p:spPr/>
-        <p:txBody>
-          <a:bodyPr/>
-          <a:lstStyle/>
-          <a:p>
-            <a:r>
-              <a:rPr lang="nl-NL" dirty="0"/>
-              <a:t>Going the distance</a:t>
-            </a:r>
-          </a:p>
-        </p:txBody>
-      </p:sp>
-      <p:sp>
-        <p:nvSpPr>
-          <p:cNvPr id="6" name="Tijdelijke aanduiding voor inhoud 5"/>
-          <p:cNvSpPr>
-            <a:spLocks noGrp="1"/>
-          </p:cNvSpPr>
-          <p:nvPr>
-            <p:ph idx="1"/>
-          </p:nvPr>
-        </p:nvSpPr>
-        <p:spPr/>
-        <p:txBody>
-          <a:bodyPr/>
-          <a:lstStyle/>
-          <a:p>
-            <a:pPr>
-              <a:lnSpc>
-                <a:spcPct val="100000"/>
-              </a:lnSpc>
-            </a:pPr>
-            <a:r>
-              <a:rPr lang="nl-NL" dirty="0"/>
-              <a:t>Sports metaphor</a:t>
-            </a:r>
-          </a:p>
-          <a:p>
-            <a:pPr>
-              <a:lnSpc>
-                <a:spcPct val="100000"/>
-              </a:lnSpc>
-            </a:pPr>
-            <a:endParaRPr lang="nl-NL" dirty="0"/>
-          </a:p>
-          <a:p>
-            <a:endParaRPr lang="nl-NL" dirty="0"/>
-          </a:p>
-          <a:p>
-            <a:endParaRPr lang="nl-NL" dirty="0"/>
-          </a:p>
-          <a:p>
-            <a:pPr marL="0" indent="0">
-              <a:buNone/>
-            </a:pPr>
-            <a:endParaRPr lang="nl-NL" dirty="0"/>
-          </a:p>
-          <a:p>
-            <a:pPr marL="0" indent="0">
-              <a:buNone/>
-            </a:pPr>
-            <a:endParaRPr lang="nl-NL" dirty="0"/>
-          </a:p>
-          <a:p>
-            <a:pPr marL="0" indent="0">
-              <a:buNone/>
-            </a:pPr>
-            <a:endParaRPr lang="nl-NL" dirty="0"/>
-          </a:p>
-        </p:txBody>
-      </p:sp>
-      <p:sp>
-        <p:nvSpPr>
-          <p:cNvPr id="2" name="Tijdelijke aanduiding voor datum 1"/>
-          <p:cNvSpPr>
-            <a:spLocks noGrp="1"/>
-          </p:cNvSpPr>
-          <p:nvPr>
-            <p:ph type="dt" sz="half" idx="10"/>
-          </p:nvPr>
-        </p:nvSpPr>
-        <p:spPr/>
-        <p:txBody>
-          <a:bodyPr/>
-          <a:lstStyle/>
-          <a:p>
-            <a:fld id="{D18D76BD-4F27-4DB5-A5CA-922C494401EB}" type="datetime1">
-              <a:rPr lang="nl-NL" smtClean="0"/>
-              <a:t>1-12-2019</a:t>
-            </a:fld>
-            <a:endParaRPr lang="nl-NL" dirty="0"/>
-          </a:p>
-        </p:txBody>
-      </p:sp>
-      <p:sp>
-        <p:nvSpPr>
-          <p:cNvPr id="3" name="Tijdelijke aanduiding voor voettekst 2"/>
-          <p:cNvSpPr>
-            <a:spLocks noGrp="1"/>
-          </p:cNvSpPr>
-          <p:nvPr>
-            <p:ph type="ftr" sz="quarter" idx="11"/>
-          </p:nvPr>
-        </p:nvSpPr>
-        <p:spPr/>
-        <p:txBody>
-          <a:bodyPr/>
-          <a:lstStyle/>
-          <a:p>
-            <a:r>
-              <a:rPr lang="nl-NL" dirty="0"/>
-              <a:t>Going the distance with Oracle Apex</a:t>
-            </a:r>
-          </a:p>
-        </p:txBody>
-      </p:sp>
-      <p:sp>
-        <p:nvSpPr>
-          <p:cNvPr id="4" name="Tijdelijke aanduiding voor dianummer 3"/>
-          <p:cNvSpPr>
-            <a:spLocks noGrp="1"/>
-          </p:cNvSpPr>
-          <p:nvPr>
-            <p:ph type="sldNum" sz="quarter" idx="12"/>
-          </p:nvPr>
-        </p:nvSpPr>
-        <p:spPr/>
-        <p:txBody>
-          <a:bodyPr/>
-          <a:lstStyle/>
-          <a:p>
-            <a:fld id="{63C85D72-AA85-4C41-A1AF-C673E1DFEC3B}" type="slidenum">
-              <a:rPr lang="nl-NL" smtClean="0"/>
-              <a:pPr/>
-              <a:t>2</a:t>
-            </a:fld>
-            <a:endParaRPr lang="nl-NL"/>
-          </a:p>
-        </p:txBody>
-      </p:sp>
-    </p:spTree>
-    <p:extLst>
-      <p:ext uri="{BB962C8B-B14F-4D97-AF65-F5344CB8AC3E}">
-        <p14:creationId xmlns:p14="http://schemas.microsoft.com/office/powerpoint/2010/main" val="2819726204"/>
-      </p:ext>
-    </p:extLst>
-  </p:cSld>
-  <p:clrMapOvr>
-    <a:masterClrMapping/>
-  </p:clrMapOvr>
-</p:sld>
-</file>
-
-<file path=ppt/slides/slide3.xml><?xml version="1.0" encoding="utf-8"?>
-<p:sld xmlns:a="http://schemas.openxmlformats.org/drawingml/2006/main" xmlns:r="http://schemas.openxmlformats.org/officeDocument/2006/relationships" xmlns:p="http://schemas.openxmlformats.org/presentationml/2006/main">
-  <p:cSld>
-    <p:spTree>
-      <p:nvGrpSpPr>
-        <p:cNvPr id="1" name=""/>
-        <p:cNvGrpSpPr/>
-        <p:nvPr/>
-      </p:nvGrpSpPr>
-      <p:grpSpPr>
-        <a:xfrm>
-          <a:off x="0" y="0"/>
-          <a:ext cx="0" cy="0"/>
-          <a:chOff x="0" y="0"/>
-          <a:chExt cx="0" cy="0"/>
-        </a:xfrm>
-      </p:grpSpPr>
-      <p:sp>
-        <p:nvSpPr>
-          <p:cNvPr id="5" name="Titel 4"/>
-          <p:cNvSpPr>
-            <a:spLocks noGrp="1"/>
-          </p:cNvSpPr>
-          <p:nvPr>
-            <p:ph type="title"/>
-          </p:nvPr>
-        </p:nvSpPr>
         <p:spPr>
           <a:xfrm>
             <a:off x="2771477" y="637674"/>
@@ -4466,7 +4313,7 @@
             <a:fld id="{63C85D72-AA85-4C41-A1AF-C673E1DFEC3B}" type="slidenum">
               <a:rPr lang="nl-NL" smtClean="0"/>
               <a:pPr/>
-              <a:t>3</a:t>
+              <a:t>2</a:t>
             </a:fld>
             <a:endParaRPr lang="nl-NL"/>
           </a:p>
@@ -4597,6 +4444,214 @@
 </p:sld>
 </file>
 
+<file path=ppt/slides/slide3.xml><?xml version="1.0" encoding="utf-8"?>
+<p:sld xmlns:a="http://schemas.openxmlformats.org/drawingml/2006/main" xmlns:r="http://schemas.openxmlformats.org/officeDocument/2006/relationships" xmlns:p="http://schemas.openxmlformats.org/presentationml/2006/main">
+  <p:cSld>
+    <p:spTree>
+      <p:nvGrpSpPr>
+        <p:cNvPr id="1" name=""/>
+        <p:cNvGrpSpPr/>
+        <p:nvPr/>
+      </p:nvGrpSpPr>
+      <p:grpSpPr>
+        <a:xfrm>
+          <a:off x="0" y="0"/>
+          <a:ext cx="0" cy="0"/>
+          <a:chOff x="0" y="0"/>
+          <a:chExt cx="0" cy="0"/>
+        </a:xfrm>
+      </p:grpSpPr>
+      <p:sp>
+        <p:nvSpPr>
+          <p:cNvPr id="5" name="Titel 4"/>
+          <p:cNvSpPr>
+            <a:spLocks noGrp="1"/>
+          </p:cNvSpPr>
+          <p:nvPr>
+            <p:ph type="title"/>
+          </p:nvPr>
+        </p:nvSpPr>
+        <p:spPr/>
+        <p:txBody>
+          <a:bodyPr/>
+          <a:lstStyle/>
+          <a:p>
+            <a:r>
+              <a:rPr lang="nl-NL" dirty="0"/>
+              <a:t>Your team</a:t>
+            </a:r>
+          </a:p>
+        </p:txBody>
+      </p:sp>
+      <p:sp>
+        <p:nvSpPr>
+          <p:cNvPr id="6" name="Tijdelijke aanduiding voor inhoud 5"/>
+          <p:cNvSpPr>
+            <a:spLocks noGrp="1"/>
+          </p:cNvSpPr>
+          <p:nvPr>
+            <p:ph idx="1"/>
+          </p:nvPr>
+        </p:nvSpPr>
+        <p:spPr/>
+        <p:txBody>
+          <a:bodyPr/>
+          <a:lstStyle/>
+          <a:p>
+            <a:pPr>
+              <a:lnSpc>
+                <a:spcPct val="100000"/>
+              </a:lnSpc>
+            </a:pPr>
+            <a:r>
+              <a:rPr lang="nl-NL" dirty="0"/>
+              <a:t>QSR, Nilesh, Sonny</a:t>
+            </a:r>
+          </a:p>
+          <a:p>
+            <a:pPr>
+              <a:lnSpc>
+                <a:spcPct val="100000"/>
+              </a:lnSpc>
+            </a:pPr>
+            <a:r>
+              <a:rPr lang="nl-NL" dirty="0"/>
+              <a:t>Rudennis, Jane, </a:t>
+            </a:r>
+          </a:p>
+          <a:p>
+            <a:pPr>
+              <a:lnSpc>
+                <a:spcPct val="100000"/>
+              </a:lnSpc>
+            </a:pPr>
+            <a:r>
+              <a:rPr lang="nl-NL" dirty="0"/>
+              <a:t>Combined experience min 20 years</a:t>
+            </a:r>
+          </a:p>
+          <a:p>
+            <a:pPr>
+              <a:lnSpc>
+                <a:spcPct val="100000"/>
+              </a:lnSpc>
+            </a:pPr>
+            <a:r>
+              <a:rPr lang="nl-NL" dirty="0"/>
+              <a:t>Daily runners</a:t>
+            </a:r>
+          </a:p>
+          <a:p>
+            <a:pPr marL="0" indent="0">
+              <a:buNone/>
+            </a:pPr>
+            <a:endParaRPr lang="nl-NL" dirty="0"/>
+          </a:p>
+          <a:p>
+            <a:endParaRPr lang="nl-NL" dirty="0"/>
+          </a:p>
+          <a:p>
+            <a:pPr marL="0" indent="0">
+              <a:buNone/>
+            </a:pPr>
+            <a:endParaRPr lang="nl-NL" dirty="0"/>
+          </a:p>
+          <a:p>
+            <a:pPr marL="0" indent="0">
+              <a:buNone/>
+            </a:pPr>
+            <a:endParaRPr lang="nl-NL" dirty="0"/>
+          </a:p>
+          <a:p>
+            <a:pPr marL="0" indent="0">
+              <a:buNone/>
+            </a:pPr>
+            <a:endParaRPr lang="nl-NL" dirty="0"/>
+          </a:p>
+        </p:txBody>
+      </p:sp>
+      <p:sp>
+        <p:nvSpPr>
+          <p:cNvPr id="2" name="Tijdelijke aanduiding voor datum 1"/>
+          <p:cNvSpPr>
+            <a:spLocks noGrp="1"/>
+          </p:cNvSpPr>
+          <p:nvPr>
+            <p:ph type="dt" sz="half" idx="10"/>
+          </p:nvPr>
+        </p:nvSpPr>
+        <p:spPr/>
+        <p:txBody>
+          <a:bodyPr/>
+          <a:lstStyle/>
+          <a:p>
+            <a:fld id="{D18D76BD-4F27-4DB5-A5CA-922C494401EB}" type="datetime1">
+              <a:rPr lang="nl-NL" smtClean="0"/>
+              <a:t>1-12-2019</a:t>
+            </a:fld>
+            <a:endParaRPr lang="nl-NL" dirty="0"/>
+          </a:p>
+        </p:txBody>
+      </p:sp>
+      <p:sp>
+        <p:nvSpPr>
+          <p:cNvPr id="3" name="Tijdelijke aanduiding voor voettekst 2"/>
+          <p:cNvSpPr>
+            <a:spLocks noGrp="1"/>
+          </p:cNvSpPr>
+          <p:nvPr>
+            <p:ph type="ftr" sz="quarter" idx="11"/>
+          </p:nvPr>
+        </p:nvSpPr>
+        <p:spPr/>
+        <p:txBody>
+          <a:bodyPr/>
+          <a:lstStyle/>
+          <a:p>
+            <a:r>
+              <a:rPr lang="nl-NL" dirty="0"/>
+              <a:t>Going the distance with Oracle Apex</a:t>
+            </a:r>
+          </a:p>
+        </p:txBody>
+      </p:sp>
+      <p:sp>
+        <p:nvSpPr>
+          <p:cNvPr id="4" name="Tijdelijke aanduiding voor dianummer 3"/>
+          <p:cNvSpPr>
+            <a:spLocks noGrp="1"/>
+          </p:cNvSpPr>
+          <p:nvPr>
+            <p:ph type="sldNum" sz="quarter" idx="12"/>
+          </p:nvPr>
+        </p:nvSpPr>
+        <p:spPr/>
+        <p:txBody>
+          <a:bodyPr/>
+          <a:lstStyle/>
+          <a:p>
+            <a:fld id="{63C85D72-AA85-4C41-A1AF-C673E1DFEC3B}" type="slidenum">
+              <a:rPr lang="nl-NL" smtClean="0"/>
+              <a:pPr/>
+              <a:t>3</a:t>
+            </a:fld>
+            <a:endParaRPr lang="nl-NL"/>
+          </a:p>
+        </p:txBody>
+      </p:sp>
+    </p:spTree>
+    <p:extLst>
+      <p:ext uri="{BB962C8B-B14F-4D97-AF65-F5344CB8AC3E}">
+        <p14:creationId xmlns:p14="http://schemas.microsoft.com/office/powerpoint/2010/main" val="2725758747"/>
+      </p:ext>
+    </p:extLst>
+  </p:cSld>
+  <p:clrMapOvr>
+    <a:masterClrMapping/>
+  </p:clrMapOvr>
+</p:sld>
+</file>
+
 <file path=ppt/slides/slide4.xml><?xml version="1.0" encoding="utf-8"?>
 <p:sld xmlns:a="http://schemas.openxmlformats.org/drawingml/2006/main" xmlns:r="http://schemas.openxmlformats.org/officeDocument/2006/relationships" xmlns:p="http://schemas.openxmlformats.org/presentationml/2006/main">
   <p:cSld>
@@ -4631,7 +4686,7 @@
           <a:p>
             <a:r>
               <a:rPr lang="nl-NL" dirty="0"/>
-              <a:t>Your team</a:t>
+              <a:t>Going the distance</a:t>
             </a:r>
           </a:p>
         </p:txBody>
@@ -4657,9 +4712,43 @@
               </a:lnSpc>
             </a:pPr>
             <a:r>
+              <a:rPr lang="nl-NL" strike="sngStrike" dirty="0"/>
+              <a:t>Old </a:t>
+            </a:r>
+            <a:r>
               <a:rPr lang="nl-NL" dirty="0"/>
-              <a:t>QSR, Nilesh, Felicia, Shane, Michelle</a:t>
-            </a:r>
+              <a:t>Mature</a:t>
+            </a:r>
+          </a:p>
+          <a:p>
+            <a:pPr lvl="1">
+              <a:lnSpc>
+                <a:spcPct val="100000"/>
+              </a:lnSpc>
+            </a:pPr>
+            <a:r>
+              <a:rPr lang="nl-NL" dirty="0"/>
+              <a:t>SQL, PL/SQL, some Java</a:t>
+            </a:r>
+          </a:p>
+          <a:p>
+            <a:pPr lvl="1">
+              <a:lnSpc>
+                <a:spcPct val="100000"/>
+              </a:lnSpc>
+            </a:pPr>
+            <a:r>
+              <a:rPr lang="nl-NL" dirty="0"/>
+              <a:t>HTML, CSS, Javascript (jQuery)</a:t>
+            </a:r>
+          </a:p>
+          <a:p>
+            <a:pPr lvl="1">
+              <a:lnSpc>
+                <a:spcPct val="100000"/>
+              </a:lnSpc>
+            </a:pPr>
+            <a:endParaRPr lang="nl-NL" dirty="0"/>
           </a:p>
           <a:p>
             <a:pPr>
@@ -4669,7 +4758,7 @@
             </a:pPr>
             <a:r>
               <a:rPr lang="nl-NL" dirty="0"/>
-              <a:t>Rudennis, Jane, </a:t>
+              <a:t>Clear vision</a:t>
             </a:r>
           </a:p>
           <a:p>
@@ -4680,7 +4769,7 @@
             </a:pPr>
             <a:r>
               <a:rPr lang="nl-NL" dirty="0"/>
-              <a:t>Combined experience min 20 years</a:t>
+              <a:t>Proven</a:t>
             </a:r>
           </a:p>
           <a:p>
@@ -4689,37 +4778,18 @@
                 <a:spcPct val="100000"/>
               </a:lnSpc>
             </a:pPr>
+            <a:endParaRPr lang="nl-NL" dirty="0"/>
+          </a:p>
+          <a:p>
+            <a:pPr>
+              <a:lnSpc>
+                <a:spcPct val="100000"/>
+              </a:lnSpc>
+            </a:pPr>
             <a:r>
               <a:rPr lang="nl-NL" dirty="0"/>
-              <a:t>Daily runners</a:t>
-            </a:r>
-          </a:p>
-          <a:p>
-            <a:pPr marL="0" indent="0">
-              <a:buNone/>
-            </a:pPr>
-            <a:endParaRPr lang="nl-NL" dirty="0"/>
-          </a:p>
-          <a:p>
-            <a:endParaRPr lang="nl-NL" dirty="0"/>
-          </a:p>
-          <a:p>
-            <a:pPr marL="0" indent="0">
-              <a:buNone/>
-            </a:pPr>
-            <a:endParaRPr lang="nl-NL" dirty="0"/>
-          </a:p>
-          <a:p>
-            <a:pPr marL="0" indent="0">
-              <a:buNone/>
-            </a:pPr>
-            <a:endParaRPr lang="nl-NL" dirty="0"/>
-          </a:p>
-          <a:p>
-            <a:pPr marL="0" indent="0">
-              <a:buNone/>
-            </a:pPr>
-            <a:endParaRPr lang="nl-NL" dirty="0"/>
+              <a:t>Web browser only</a:t>
+            </a:r>
           </a:p>
         </p:txBody>
       </p:sp>
@@ -4795,7 +4865,7 @@
     </p:spTree>
     <p:extLst>
       <p:ext uri="{BB962C8B-B14F-4D97-AF65-F5344CB8AC3E}">
-        <p14:creationId xmlns:p14="http://schemas.microsoft.com/office/powerpoint/2010/main" val="2725758747"/>
+        <p14:creationId xmlns:p14="http://schemas.microsoft.com/office/powerpoint/2010/main" val="2819726204"/>
       </p:ext>
     </p:extLst>
   </p:cSld>
@@ -4865,25 +4935,31 @@
               </a:lnSpc>
             </a:pPr>
             <a:r>
-              <a:rPr lang="nl-NL" dirty="0">
-                <a:hlinkClick r:id="rId3"/>
-              </a:rPr>
+              <a:rPr lang="nl-NL" dirty="0"/>
+              <a:t>Github: </a:t>
+            </a:r>
+          </a:p>
+          <a:p>
+            <a:pPr lvl="1">
+              <a:lnSpc>
+                <a:spcPct val="100000"/>
+              </a:lnSpc>
+            </a:pPr>
+            <a:r>
+              <a:rPr lang="nl-NL" dirty="0"/>
+              <a:t>https://github.com/SullivanC137/Apex-Workshops</a:t>
+            </a:r>
+          </a:p>
+          <a:p>
+            <a:pPr>
+              <a:lnSpc>
+                <a:spcPct val="100000"/>
+              </a:lnSpc>
+            </a:pPr>
+            <a:r>
+              <a:rPr lang="nl-NL" dirty="0"/>
               <a:t>Apex.oracle.com</a:t>
             </a:r>
-          </a:p>
-          <a:p>
-            <a:pPr>
-              <a:lnSpc>
-                <a:spcPct val="100000"/>
-              </a:lnSpc>
-            </a:pPr>
-            <a:r>
-              <a:rPr lang="nl-NL" dirty="0">
-                <a:hlinkClick r:id="rId3"/>
-              </a:rPr>
-              <a:t>http://bit.do/apexws0-60</a:t>
-            </a:r>
-            <a:endParaRPr lang="nl-NL" dirty="0"/>
           </a:p>
           <a:p>
             <a:pPr>
@@ -5202,7 +5278,7 @@
             </a:pPr>
             <a:r>
               <a:rPr lang="nl-NL" dirty="0"/>
-              <a:t>Instructions.txt</a:t>
+              <a:t>Instructions/screenshots</a:t>
             </a:r>
           </a:p>
           <a:p>
@@ -5213,8 +5289,25 @@
             </a:pPr>
             <a:r>
               <a:rPr lang="nl-NL" dirty="0"/>
-              <a:t>Drive</a:t>
-            </a:r>
+              <a:t>Use case: An app to register running events</a:t>
+            </a:r>
+          </a:p>
+          <a:p>
+            <a:pPr marL="0" indent="0">
+              <a:lnSpc>
+                <a:spcPct val="100000"/>
+              </a:lnSpc>
+              <a:buNone/>
+            </a:pPr>
+            <a:endParaRPr lang="nl-NL" dirty="0"/>
+          </a:p>
+          <a:p>
+            <a:pPr lvl="1">
+              <a:lnSpc>
+                <a:spcPct val="100000"/>
+              </a:lnSpc>
+            </a:pPr>
+            <a:endParaRPr lang="nl-NL" dirty="0"/>
           </a:p>
           <a:p>
             <a:pPr marL="0" indent="0">

</xml_diff>

<commit_message>
Added instructions and app
</commit_message>
<xml_diff>
--- a/Going the distance/goingTheDistance.pptx
+++ b/Going the distance/goingTheDistance.pptx
@@ -118,6 +118,25 @@
     </a:lvl9pPr>
   </p:defaultTextStyle>
   <p:extLst>
+    <p:ext uri="{521415D9-36F7-43E2-AB2F-B90AF26B5E84}">
+      <p14:sectionLst xmlns:p14="http://schemas.microsoft.com/office/powerpoint/2010/main">
+        <p14:section name="Untitled Section" id="{312BF459-05BC-4BF4-8859-3A011676208F}">
+          <p14:sldIdLst>
+            <p14:sldId id="256"/>
+            <p14:sldId id="305"/>
+            <p14:sldId id="306"/>
+            <p14:sldId id="257"/>
+            <p14:sldId id="307"/>
+            <p14:sldId id="308"/>
+            <p14:sldId id="309"/>
+            <p14:sldId id="311"/>
+            <p14:sldId id="313"/>
+            <p14:sldId id="310"/>
+            <p14:sldId id="312"/>
+          </p14:sldIdLst>
+        </p14:section>
+      </p14:sectionLst>
+    </p:ext>
     <p:ext uri="{EFAFB233-063F-42B5-8137-9DF3F51BA10A}">
       <p15:sldGuideLst xmlns:p15="http://schemas.microsoft.com/office/powerpoint/2012/main">
         <p15:guide id="1" orient="horz" pos="921">
@@ -153,6 +172,96 @@
 </p:cmAuthorLst>
 </file>
 
+<file path=ppt/revisionInfo.xml><?xml version="1.0" encoding="utf-8"?>
+<p1510:revInfo xmlns:a="http://schemas.openxmlformats.org/drawingml/2006/main" xmlns:r="http://schemas.openxmlformats.org/officeDocument/2006/relationships" xmlns:p1510="http://schemas.microsoft.com/office/powerpoint/2015/10/main">
+  <p1510:revLst>
+    <p1510:client id="{15F6C08F-0141-49FA-B995-4E49883B76E1}" v="6" dt="2019-12-05T21:49:14.320"/>
+  </p1510:revLst>
+</p1510:revInfo>
+</file>
+
+<file path=ppt/changesInfos/changesInfo1.xml><?xml version="1.0" encoding="utf-8"?>
+<pc:chgInfo xmlns:a="http://schemas.openxmlformats.org/drawingml/2006/main" xmlns:r="http://schemas.openxmlformats.org/officeDocument/2006/relationships" xmlns:ac="http://schemas.microsoft.com/office/drawing/2013/main/command" xmlns:pc="http://schemas.microsoft.com/office/powerpoint/2013/main/command">
+  <pc:docChgLst>
+    <pc:chgData name="Sullivan Kromosoeto" userId="d72554580f1bc662" providerId="LiveId" clId="{15F6C08F-0141-49FA-B995-4E49883B76E1}"/>
+    <pc:docChg chg="custSel modSld addSection">
+      <pc:chgData name="Sullivan Kromosoeto" userId="d72554580f1bc662" providerId="LiveId" clId="{15F6C08F-0141-49FA-B995-4E49883B76E1}" dt="2019-12-05T21:54:43.530" v="237" actId="20577"/>
+      <pc:docMkLst>
+        <pc:docMk/>
+      </pc:docMkLst>
+      <pc:sldChg chg="addSp modSp">
+        <pc:chgData name="Sullivan Kromosoeto" userId="d72554580f1bc662" providerId="LiveId" clId="{15F6C08F-0141-49FA-B995-4E49883B76E1}" dt="2019-12-05T21:16:54.598" v="50" actId="207"/>
+        <pc:sldMkLst>
+          <pc:docMk/>
+          <pc:sldMk cId="4016675747" sldId="256"/>
+        </pc:sldMkLst>
+        <pc:spChg chg="add mod">
+          <ac:chgData name="Sullivan Kromosoeto" userId="d72554580f1bc662" providerId="LiveId" clId="{15F6C08F-0141-49FA-B995-4E49883B76E1}" dt="2019-12-05T21:16:54.598" v="50" actId="207"/>
+          <ac:spMkLst>
+            <pc:docMk/>
+            <pc:sldMk cId="4016675747" sldId="256"/>
+            <ac:spMk id="4" creationId="{C975D72E-95B7-4920-9957-3AB4AAA4D1D7}"/>
+          </ac:spMkLst>
+        </pc:spChg>
+      </pc:sldChg>
+      <pc:sldChg chg="modSp">
+        <pc:chgData name="Sullivan Kromosoeto" userId="d72554580f1bc662" providerId="LiveId" clId="{15F6C08F-0141-49FA-B995-4E49883B76E1}" dt="2019-12-05T21:14:43.047" v="42" actId="20577"/>
+        <pc:sldMkLst>
+          <pc:docMk/>
+          <pc:sldMk cId="2725758747" sldId="306"/>
+        </pc:sldMkLst>
+        <pc:spChg chg="mod">
+          <ac:chgData name="Sullivan Kromosoeto" userId="d72554580f1bc662" providerId="LiveId" clId="{15F6C08F-0141-49FA-B995-4E49883B76E1}" dt="2019-12-05T21:14:43.047" v="42" actId="20577"/>
+          <ac:spMkLst>
+            <pc:docMk/>
+            <pc:sldMk cId="2725758747" sldId="306"/>
+            <ac:spMk id="6" creationId="{00000000-0000-0000-0000-000000000000}"/>
+          </ac:spMkLst>
+        </pc:spChg>
+      </pc:sldChg>
+      <pc:sldChg chg="addSp modSp">
+        <pc:chgData name="Sullivan Kromosoeto" userId="d72554580f1bc662" providerId="LiveId" clId="{15F6C08F-0141-49FA-B995-4E49883B76E1}" dt="2019-12-05T21:52:43.545" v="175" actId="20577"/>
+        <pc:sldMkLst>
+          <pc:docMk/>
+          <pc:sldMk cId="2592319640" sldId="307"/>
+        </pc:sldMkLst>
+        <pc:spChg chg="mod">
+          <ac:chgData name="Sullivan Kromosoeto" userId="d72554580f1bc662" providerId="LiveId" clId="{15F6C08F-0141-49FA-B995-4E49883B76E1}" dt="2019-12-05T21:49:58.829" v="55" actId="20577"/>
+          <ac:spMkLst>
+            <pc:docMk/>
+            <pc:sldMk cId="2592319640" sldId="307"/>
+            <ac:spMk id="6" creationId="{00000000-0000-0000-0000-000000000000}"/>
+          </ac:spMkLst>
+        </pc:spChg>
+        <pc:spChg chg="add mod">
+          <ac:chgData name="Sullivan Kromosoeto" userId="d72554580f1bc662" providerId="LiveId" clId="{15F6C08F-0141-49FA-B995-4E49883B76E1}" dt="2019-12-05T21:52:43.545" v="175" actId="20577"/>
+          <ac:spMkLst>
+            <pc:docMk/>
+            <pc:sldMk cId="2592319640" sldId="307"/>
+            <ac:spMk id="7" creationId="{17E138FF-C70A-4482-854D-5E220F78CC34}"/>
+          </ac:spMkLst>
+        </pc:spChg>
+      </pc:sldChg>
+      <pc:sldChg chg="modSp">
+        <pc:chgData name="Sullivan Kromosoeto" userId="d72554580f1bc662" providerId="LiveId" clId="{15F6C08F-0141-49FA-B995-4E49883B76E1}" dt="2019-12-05T21:54:43.530" v="237" actId="20577"/>
+        <pc:sldMkLst>
+          <pc:docMk/>
+          <pc:sldMk cId="1665305157" sldId="308"/>
+        </pc:sldMkLst>
+        <pc:spChg chg="mod">
+          <ac:chgData name="Sullivan Kromosoeto" userId="d72554580f1bc662" providerId="LiveId" clId="{15F6C08F-0141-49FA-B995-4E49883B76E1}" dt="2019-12-05T21:54:43.530" v="237" actId="20577"/>
+          <ac:spMkLst>
+            <pc:docMk/>
+            <pc:sldMk cId="1665305157" sldId="308"/>
+            <ac:spMk id="6" creationId="{00000000-0000-0000-0000-000000000000}"/>
+          </ac:spMkLst>
+        </pc:spChg>
+      </pc:sldChg>
+    </pc:docChg>
+  </pc:docChgLst>
+</pc:chgInfo>
+</file>
+
 <file path=ppt/notesMasters/notesMaster1.xml><?xml version="1.0" encoding="utf-8"?>
 <p:notesMaster xmlns:a="http://schemas.openxmlformats.org/drawingml/2006/main" xmlns:r="http://schemas.openxmlformats.org/officeDocument/2006/relationships" xmlns:p="http://schemas.openxmlformats.org/presentationml/2006/main">
   <p:cSld>
@@ -235,7 +344,7 @@
           <a:p>
             <a:fld id="{28A5D3D3-A19D-414F-953D-80813D8E2AB1}" type="datetimeFigureOut">
               <a:rPr lang="nl-NL" smtClean="0"/>
-              <a:t>1-12-2019</a:t>
+              <a:t>5-12-2019</a:t>
             </a:fld>
             <a:endParaRPr lang="nl-NL"/>
           </a:p>
@@ -1843,7 +1952,7 @@
           <a:p>
             <a:fld id="{40941887-51CF-479A-A29B-0DBBDA9BB4AA}" type="datetime1">
               <a:rPr lang="nl-NL" smtClean="0"/>
-              <a:t>1-12-2019</a:t>
+              <a:t>5-12-2019</a:t>
             </a:fld>
             <a:endParaRPr lang="nl-NL"/>
           </a:p>
@@ -1964,7 +2073,7 @@
           <a:p>
             <a:fld id="{BE6DFB06-0C6F-4C7D-9824-6ACED1FD5B95}" type="datetime1">
               <a:rPr lang="nl-NL" smtClean="0"/>
-              <a:t>1-12-2019</a:t>
+              <a:t>5-12-2019</a:t>
             </a:fld>
             <a:endParaRPr lang="nl-NL"/>
           </a:p>
@@ -2279,7 +2388,7 @@
           <a:p>
             <a:fld id="{B44FC5E2-AABA-4827-9120-4871278E3F4E}" type="datetime1">
               <a:rPr lang="nl-NL" smtClean="0"/>
-              <a:t>1-12-2019</a:t>
+              <a:t>5-12-2019</a:t>
             </a:fld>
             <a:endParaRPr lang="nl-NL"/>
           </a:p>
@@ -2496,7 +2605,7 @@
           <a:p>
             <a:fld id="{29C33BAD-269F-4642-9656-1D4C5696D9A7}" type="datetime1">
               <a:rPr lang="nl-NL" smtClean="0"/>
-              <a:t>1-12-2019</a:t>
+              <a:t>5-12-2019</a:t>
             </a:fld>
             <a:endParaRPr lang="nl-NL"/>
           </a:p>
@@ -2657,7 +2766,7 @@
           <a:p>
             <a:fld id="{E871F567-E0F0-4510-BFB2-2824EFFB0B3C}" type="datetime1">
               <a:rPr lang="nl-NL" smtClean="0"/>
-              <a:t>1-12-2019</a:t>
+              <a:t>5-12-2019</a:t>
             </a:fld>
             <a:endParaRPr lang="nl-NL"/>
           </a:p>
@@ -2796,7 +2905,7 @@
           <a:p>
             <a:fld id="{E81DE857-35B0-4139-9D89-66566AFC98AA}" type="datetime1">
               <a:rPr lang="nl-NL" smtClean="0"/>
-              <a:t>1-12-2019</a:t>
+              <a:t>5-12-2019</a:t>
             </a:fld>
             <a:endParaRPr lang="nl-NL"/>
           </a:p>
@@ -3208,7 +3317,7 @@
           <a:p>
             <a:fld id="{6AF1B907-6A44-4057-80FC-549750E356F4}" type="datetime1">
               <a:rPr lang="nl-NL" smtClean="0"/>
-              <a:t>1-12-2019</a:t>
+              <a:t>5-12-2019</a:t>
             </a:fld>
             <a:endParaRPr lang="nl-NL"/>
           </a:p>
@@ -3660,6 +3769,49 @@
           </a:p>
         </p:txBody>
       </p:sp>
+      <p:sp>
+        <p:nvSpPr>
+          <p:cNvPr id="4" name="Rectangle 3">
+            <a:extLst>
+              <a:ext uri="{FF2B5EF4-FFF2-40B4-BE49-F238E27FC236}">
+                <a16:creationId xmlns:a16="http://schemas.microsoft.com/office/drawing/2014/main" id="{C975D72E-95B7-4920-9957-3AB4AAA4D1D7}"/>
+              </a:ext>
+            </a:extLst>
+          </p:cNvPr>
+          <p:cNvSpPr/>
+          <p:nvPr/>
+        </p:nvSpPr>
+        <p:spPr>
+          <a:xfrm>
+            <a:off x="2506718" y="6080262"/>
+            <a:ext cx="6637282" cy="369332"/>
+          </a:xfrm>
+          <a:prstGeom prst="rect">
+            <a:avLst/>
+          </a:prstGeom>
+        </p:spPr>
+        <p:txBody>
+          <a:bodyPr wrap="square">
+            <a:spAutoFit/>
+          </a:bodyPr>
+          <a:lstStyle/>
+          <a:p>
+            <a:pPr lvl="1">
+              <a:lnSpc>
+                <a:spcPct val="100000"/>
+              </a:lnSpc>
+            </a:pPr>
+            <a:r>
+              <a:rPr lang="nl-NL" dirty="0">
+                <a:solidFill>
+                  <a:schemeClr val="bg1"/>
+                </a:solidFill>
+              </a:rPr>
+              <a:t>https://github.com/SullivanC137/Apex-Workshops</a:t>
+            </a:r>
+          </a:p>
+        </p:txBody>
+      </p:sp>
     </p:spTree>
     <p:extLst>
       <p:ext uri="{BB962C8B-B14F-4D97-AF65-F5344CB8AC3E}">
@@ -3811,7 +3963,7 @@
           <a:p>
             <a:fld id="{D18D76BD-4F27-4DB5-A5CA-922C494401EB}" type="datetime1">
               <a:rPr lang="nl-NL" smtClean="0"/>
-              <a:t>1-12-2019</a:t>
+              <a:t>5-12-2019</a:t>
             </a:fld>
             <a:endParaRPr lang="nl-NL" dirty="0"/>
           </a:p>
@@ -4017,7 +4169,7 @@
           <a:p>
             <a:fld id="{D18D76BD-4F27-4DB5-A5CA-922C494401EB}" type="datetime1">
               <a:rPr lang="nl-NL" smtClean="0"/>
-              <a:t>1-12-2019</a:t>
+              <a:t>5-12-2019</a:t>
             </a:fld>
             <a:endParaRPr lang="nl-NL" dirty="0"/>
           </a:p>
@@ -4267,7 +4419,7 @@
           <a:p>
             <a:fld id="{D18D76BD-4F27-4DB5-A5CA-922C494401EB}" type="datetime1">
               <a:rPr lang="nl-NL" smtClean="0"/>
-              <a:t>1-12-2019</a:t>
+              <a:t>5-12-2019</a:t>
             </a:fld>
             <a:endParaRPr lang="nl-NL" dirty="0"/>
           </a:p>
@@ -4516,7 +4668,7 @@
             </a:pPr>
             <a:r>
               <a:rPr lang="nl-NL" dirty="0"/>
-              <a:t>Rudennis, Jane, </a:t>
+              <a:t>Rudennis</a:t>
             </a:r>
           </a:p>
           <a:p>
@@ -4527,7 +4679,7 @@
             </a:pPr>
             <a:r>
               <a:rPr lang="nl-NL" dirty="0"/>
-              <a:t>Combined experience min 20 years</a:t>
+              <a:t>20 years combined experience</a:t>
             </a:r>
           </a:p>
           <a:p>
@@ -4541,33 +4693,6 @@
               <a:t>Daily runners</a:t>
             </a:r>
           </a:p>
-          <a:p>
-            <a:pPr marL="0" indent="0">
-              <a:buNone/>
-            </a:pPr>
-            <a:endParaRPr lang="nl-NL" dirty="0"/>
-          </a:p>
-          <a:p>
-            <a:endParaRPr lang="nl-NL" dirty="0"/>
-          </a:p>
-          <a:p>
-            <a:pPr marL="0" indent="0">
-              <a:buNone/>
-            </a:pPr>
-            <a:endParaRPr lang="nl-NL" dirty="0"/>
-          </a:p>
-          <a:p>
-            <a:pPr marL="0" indent="0">
-              <a:buNone/>
-            </a:pPr>
-            <a:endParaRPr lang="nl-NL" dirty="0"/>
-          </a:p>
-          <a:p>
-            <a:pPr marL="0" indent="0">
-              <a:buNone/>
-            </a:pPr>
-            <a:endParaRPr lang="nl-NL" dirty="0"/>
-          </a:p>
         </p:txBody>
       </p:sp>
       <p:sp>
@@ -4587,7 +4712,7 @@
           <a:p>
             <a:fld id="{D18D76BD-4F27-4DB5-A5CA-922C494401EB}" type="datetime1">
               <a:rPr lang="nl-NL" smtClean="0"/>
-              <a:t>1-12-2019</a:t>
+              <a:t>5-12-2019</a:t>
             </a:fld>
             <a:endParaRPr lang="nl-NL" dirty="0"/>
           </a:p>
@@ -4810,7 +4935,7 @@
           <a:p>
             <a:fld id="{D18D76BD-4F27-4DB5-A5CA-922C494401EB}" type="datetime1">
               <a:rPr lang="nl-NL" smtClean="0"/>
-              <a:t>1-12-2019</a:t>
+              <a:t>5-12-2019</a:t>
             </a:fld>
             <a:endParaRPr lang="nl-NL" dirty="0"/>
           </a:p>
@@ -4924,43 +5049,15 @@
             <p:ph idx="1"/>
           </p:nvPr>
         </p:nvSpPr>
-        <p:spPr/>
-        <p:txBody>
-          <a:bodyPr/>
-          <a:lstStyle/>
-          <a:p>
-            <a:pPr>
-              <a:lnSpc>
-                <a:spcPct val="100000"/>
-              </a:lnSpc>
-            </a:pPr>
-            <a:r>
-              <a:rPr lang="nl-NL" dirty="0"/>
-              <a:t>Github: </a:t>
-            </a:r>
-          </a:p>
-          <a:p>
-            <a:pPr lvl="1">
-              <a:lnSpc>
-                <a:spcPct val="100000"/>
-              </a:lnSpc>
-            </a:pPr>
-            <a:r>
-              <a:rPr lang="nl-NL" dirty="0"/>
-              <a:t>https://github.com/SullivanC137/Apex-Workshops</a:t>
-            </a:r>
-          </a:p>
-          <a:p>
-            <a:pPr>
-              <a:lnSpc>
-                <a:spcPct val="100000"/>
-              </a:lnSpc>
-            </a:pPr>
-            <a:r>
-              <a:rPr lang="nl-NL" dirty="0"/>
-              <a:t>Apex.oracle.com</a:t>
-            </a:r>
-          </a:p>
+        <p:spPr>
+          <a:xfrm>
+            <a:off x="975360" y="1653540"/>
+            <a:ext cx="3596640" cy="4525963"/>
+          </a:xfrm>
+        </p:spPr>
+        <p:txBody>
+          <a:bodyPr/>
+          <a:lstStyle/>
           <a:p>
             <a:pPr>
               <a:lnSpc>
@@ -5136,7 +5233,7 @@
           <a:p>
             <a:fld id="{D18D76BD-4F27-4DB5-A5CA-922C494401EB}" type="datetime1">
               <a:rPr lang="nl-NL" smtClean="0"/>
-              <a:t>1-12-2019</a:t>
+              <a:t>5-12-2019</a:t>
             </a:fld>
             <a:endParaRPr lang="nl-NL" dirty="0"/>
           </a:p>
@@ -5185,6 +5282,326 @@
               <a:t>5</a:t>
             </a:fld>
             <a:endParaRPr lang="nl-NL"/>
+          </a:p>
+        </p:txBody>
+      </p:sp>
+      <p:sp>
+        <p:nvSpPr>
+          <p:cNvPr id="7" name="Tijdelijke aanduiding voor inhoud 5">
+            <a:extLst>
+              <a:ext uri="{FF2B5EF4-FFF2-40B4-BE49-F238E27FC236}">
+                <a16:creationId xmlns:a16="http://schemas.microsoft.com/office/drawing/2014/main" id="{17E138FF-C70A-4482-854D-5E220F78CC34}"/>
+              </a:ext>
+            </a:extLst>
+          </p:cNvPr>
+          <p:cNvSpPr txBox="1">
+            <a:spLocks/>
+          </p:cNvSpPr>
+          <p:nvPr/>
+        </p:nvSpPr>
+        <p:spPr>
+          <a:xfrm>
+            <a:off x="4572000" y="1653539"/>
+            <a:ext cx="3596640" cy="4525963"/>
+          </a:xfrm>
+          <a:prstGeom prst="rect">
+            <a:avLst/>
+          </a:prstGeom>
+        </p:spPr>
+        <p:txBody>
+          <a:bodyPr vert="horz" lIns="91440" tIns="45720" rIns="91440" bIns="45720" rtlCol="0">
+            <a:noAutofit/>
+          </a:bodyPr>
+          <a:lstStyle>
+            <a:lvl1pPr marL="288000" indent="-288000" algn="l" defTabSz="914400" rtl="0" eaLnBrk="1" latinLnBrk="0" hangingPunct="1">
+              <a:lnSpc>
+                <a:spcPts val="3000"/>
+              </a:lnSpc>
+              <a:spcBef>
+                <a:spcPts val="0"/>
+              </a:spcBef>
+              <a:buSzPct val="115000"/>
+              <a:buFont typeface="Symbol" panose="05050102010706020507" pitchFamily="18" charset="2"/>
+              <a:buChar char=""/>
+              <a:defRPr sz="2000" kern="1200">
+                <a:solidFill>
+                  <a:schemeClr val="tx1"/>
+                </a:solidFill>
+                <a:latin typeface="+mn-lt"/>
+                <a:ea typeface="+mn-ea"/>
+                <a:cs typeface="+mn-cs"/>
+              </a:defRPr>
+            </a:lvl1pPr>
+            <a:lvl2pPr marL="576000" indent="-288000" algn="l" defTabSz="914400" rtl="0" eaLnBrk="1" latinLnBrk="0" hangingPunct="1">
+              <a:lnSpc>
+                <a:spcPts val="3000"/>
+              </a:lnSpc>
+              <a:spcBef>
+                <a:spcPts val="0"/>
+              </a:spcBef>
+              <a:buSzPct val="80000"/>
+              <a:buFont typeface="MS Reference Sans Serif" panose="020B0604030504040204" pitchFamily="34" charset="0"/>
+              <a:buChar char="□"/>
+              <a:defRPr sz="1800" kern="1200">
+                <a:solidFill>
+                  <a:schemeClr val="tx1"/>
+                </a:solidFill>
+                <a:latin typeface="+mn-lt"/>
+                <a:ea typeface="+mn-ea"/>
+                <a:cs typeface="+mn-cs"/>
+              </a:defRPr>
+            </a:lvl2pPr>
+            <a:lvl3pPr marL="864000" indent="-288000" algn="l" defTabSz="914400" rtl="0" eaLnBrk="1" latinLnBrk="0" hangingPunct="1">
+              <a:lnSpc>
+                <a:spcPts val="3000"/>
+              </a:lnSpc>
+              <a:spcBef>
+                <a:spcPts val="0"/>
+              </a:spcBef>
+              <a:buSzPct val="80000"/>
+              <a:buFont typeface="Wingdings" panose="05000000000000000000" pitchFamily="2" charset="2"/>
+              <a:buChar char="§"/>
+              <a:defRPr sz="1800" kern="1200">
+                <a:solidFill>
+                  <a:schemeClr val="tx1"/>
+                </a:solidFill>
+                <a:latin typeface="+mn-lt"/>
+                <a:ea typeface="+mn-ea"/>
+                <a:cs typeface="+mn-cs"/>
+              </a:defRPr>
+            </a:lvl3pPr>
+            <a:lvl4pPr marL="1166813" indent="-273050" algn="l" defTabSz="914400" rtl="0" eaLnBrk="1" latinLnBrk="0" hangingPunct="1">
+              <a:lnSpc>
+                <a:spcPts val="3000"/>
+              </a:lnSpc>
+              <a:spcBef>
+                <a:spcPts val="0"/>
+              </a:spcBef>
+              <a:buSzPct val="80000"/>
+              <a:buFont typeface="MS Reference Sans Serif" panose="020B0604030504040204" pitchFamily="34" charset="0"/>
+              <a:buChar char="–"/>
+              <a:defRPr sz="1800" kern="1200">
+                <a:solidFill>
+                  <a:schemeClr val="tx1"/>
+                </a:solidFill>
+                <a:latin typeface="+mn-lt"/>
+                <a:ea typeface="+mn-ea"/>
+                <a:cs typeface="+mn-cs"/>
+              </a:defRPr>
+            </a:lvl4pPr>
+            <a:lvl5pPr marL="1522413" indent="-355600" algn="l" defTabSz="914400" rtl="0" eaLnBrk="1" latinLnBrk="0" hangingPunct="1">
+              <a:lnSpc>
+                <a:spcPts val="3000"/>
+              </a:lnSpc>
+              <a:spcBef>
+                <a:spcPts val="0"/>
+              </a:spcBef>
+              <a:buSzPct val="80000"/>
+              <a:buFont typeface="MS Reference Sans Serif" panose="020B0604030504040204" pitchFamily="34" charset="0"/>
+              <a:buChar char="–"/>
+              <a:defRPr sz="1800" kern="1200">
+                <a:solidFill>
+                  <a:schemeClr val="tx1"/>
+                </a:solidFill>
+                <a:latin typeface="+mn-lt"/>
+                <a:ea typeface="+mn-ea"/>
+                <a:cs typeface="+mn-cs"/>
+              </a:defRPr>
+            </a:lvl5pPr>
+            <a:lvl6pPr marL="2514600" indent="-228600" algn="l" defTabSz="914400" rtl="0" eaLnBrk="1" latinLnBrk="0" hangingPunct="1">
+              <a:spcBef>
+                <a:spcPct val="20000"/>
+              </a:spcBef>
+              <a:buFont typeface="Arial" pitchFamily="34" charset="0"/>
+              <a:buChar char="•"/>
+              <a:defRPr sz="2000" kern="1200">
+                <a:solidFill>
+                  <a:schemeClr val="tx1"/>
+                </a:solidFill>
+                <a:latin typeface="+mn-lt"/>
+                <a:ea typeface="+mn-ea"/>
+                <a:cs typeface="+mn-cs"/>
+              </a:defRPr>
+            </a:lvl6pPr>
+            <a:lvl7pPr marL="2971800" indent="-228600" algn="l" defTabSz="914400" rtl="0" eaLnBrk="1" latinLnBrk="0" hangingPunct="1">
+              <a:spcBef>
+                <a:spcPct val="20000"/>
+              </a:spcBef>
+              <a:buFont typeface="Arial" pitchFamily="34" charset="0"/>
+              <a:buChar char="•"/>
+              <a:defRPr sz="2000" kern="1200">
+                <a:solidFill>
+                  <a:schemeClr val="tx1"/>
+                </a:solidFill>
+                <a:latin typeface="+mn-lt"/>
+                <a:ea typeface="+mn-ea"/>
+                <a:cs typeface="+mn-cs"/>
+              </a:defRPr>
+            </a:lvl7pPr>
+            <a:lvl8pPr marL="3429000" indent="-228600" algn="l" defTabSz="914400" rtl="0" eaLnBrk="1" latinLnBrk="0" hangingPunct="1">
+              <a:spcBef>
+                <a:spcPct val="20000"/>
+              </a:spcBef>
+              <a:buFont typeface="Arial" pitchFamily="34" charset="0"/>
+              <a:buChar char="•"/>
+              <a:defRPr sz="2000" kern="1200">
+                <a:solidFill>
+                  <a:schemeClr val="tx1"/>
+                </a:solidFill>
+                <a:latin typeface="+mn-lt"/>
+                <a:ea typeface="+mn-ea"/>
+                <a:cs typeface="+mn-cs"/>
+              </a:defRPr>
+            </a:lvl8pPr>
+            <a:lvl9pPr marL="3886200" indent="-228600" algn="l" defTabSz="914400" rtl="0" eaLnBrk="1" latinLnBrk="0" hangingPunct="1">
+              <a:spcBef>
+                <a:spcPct val="20000"/>
+              </a:spcBef>
+              <a:buFont typeface="Arial" pitchFamily="34" charset="0"/>
+              <a:buChar char="•"/>
+              <a:defRPr sz="2000" kern="1200">
+                <a:solidFill>
+                  <a:schemeClr val="tx1"/>
+                </a:solidFill>
+                <a:latin typeface="+mn-lt"/>
+                <a:ea typeface="+mn-ea"/>
+                <a:cs typeface="+mn-cs"/>
+              </a:defRPr>
+            </a:lvl9pPr>
+          </a:lstStyle>
+          <a:p>
+            <a:pPr>
+              <a:lnSpc>
+                <a:spcPct val="100000"/>
+              </a:lnSpc>
+            </a:pPr>
+            <a:r>
+              <a:rPr lang="nl-NL" dirty="0"/>
+              <a:t>SQL Workshop</a:t>
+            </a:r>
+          </a:p>
+          <a:p>
+            <a:pPr lvl="1">
+              <a:lnSpc>
+                <a:spcPct val="100000"/>
+              </a:lnSpc>
+            </a:pPr>
+            <a:r>
+              <a:rPr lang="nl-NL" dirty="0"/>
+              <a:t>Objects</a:t>
+            </a:r>
+          </a:p>
+          <a:p>
+            <a:pPr lvl="1">
+              <a:lnSpc>
+                <a:spcPct val="100000"/>
+              </a:lnSpc>
+            </a:pPr>
+            <a:r>
+              <a:rPr lang="nl-NL" dirty="0"/>
+              <a:t>SQL commands</a:t>
+            </a:r>
+          </a:p>
+          <a:p>
+            <a:pPr lvl="1">
+              <a:lnSpc>
+                <a:spcPct val="100000"/>
+              </a:lnSpc>
+            </a:pPr>
+            <a:r>
+              <a:rPr lang="nl-NL" dirty="0"/>
+              <a:t>Quick SQL</a:t>
+            </a:r>
+          </a:p>
+          <a:p>
+            <a:pPr lvl="1">
+              <a:lnSpc>
+                <a:spcPct val="100000"/>
+              </a:lnSpc>
+            </a:pPr>
+            <a:endParaRPr lang="nl-NL" dirty="0"/>
+          </a:p>
+          <a:p>
+            <a:pPr>
+              <a:lnSpc>
+                <a:spcPct val="100000"/>
+              </a:lnSpc>
+            </a:pPr>
+            <a:r>
+              <a:rPr lang="nl-NL" dirty="0"/>
+              <a:t>Application Builder</a:t>
+            </a:r>
+          </a:p>
+          <a:p>
+            <a:pPr lvl="1">
+              <a:lnSpc>
+                <a:spcPct val="100000"/>
+              </a:lnSpc>
+            </a:pPr>
+            <a:r>
+              <a:rPr lang="nl-NL" dirty="0"/>
+              <a:t>Our first app</a:t>
+            </a:r>
+          </a:p>
+          <a:p>
+            <a:pPr lvl="1">
+              <a:lnSpc>
+                <a:spcPct val="100000"/>
+              </a:lnSpc>
+            </a:pPr>
+            <a:r>
+              <a:rPr lang="nl-NL" dirty="0"/>
+              <a:t>Import apps</a:t>
+            </a:r>
+          </a:p>
+          <a:p>
+            <a:pPr lvl="1">
+              <a:lnSpc>
+                <a:spcPct val="100000"/>
+              </a:lnSpc>
+            </a:pPr>
+            <a:endParaRPr lang="nl-NL" dirty="0"/>
+          </a:p>
+          <a:p>
+            <a:pPr>
+              <a:lnSpc>
+                <a:spcPct val="100000"/>
+              </a:lnSpc>
+            </a:pPr>
+            <a:endParaRPr lang="nl-NL" dirty="0"/>
+          </a:p>
+          <a:p>
+            <a:endParaRPr lang="nl-NL" dirty="0"/>
+          </a:p>
+          <a:p>
+            <a:endParaRPr lang="nl-NL" dirty="0"/>
+          </a:p>
+          <a:p>
+            <a:endParaRPr lang="nl-NL" dirty="0"/>
+          </a:p>
+          <a:p>
+            <a:endParaRPr lang="nl-NL" dirty="0"/>
+          </a:p>
+          <a:p>
+            <a:pPr marL="0" indent="0">
+              <a:buFont typeface="Symbol" panose="05050102010706020507" pitchFamily="18" charset="2"/>
+              <a:buNone/>
+            </a:pPr>
+            <a:endParaRPr lang="nl-NL" dirty="0"/>
+          </a:p>
+          <a:p>
+            <a:pPr marL="0" indent="0">
+              <a:buFont typeface="Symbol" panose="05050102010706020507" pitchFamily="18" charset="2"/>
+              <a:buNone/>
+            </a:pPr>
+            <a:endParaRPr lang="nl-NL" dirty="0"/>
+          </a:p>
+          <a:p>
+            <a:pPr marL="0" indent="0">
+              <a:buFont typeface="Symbol" panose="05050102010706020507" pitchFamily="18" charset="2"/>
+              <a:buNone/>
+            </a:pPr>
+            <a:endParaRPr lang="nl-NL" dirty="0"/>
           </a:p>
         </p:txBody>
       </p:sp>
@@ -5267,30 +5684,20 @@
             </a:pPr>
             <a:r>
               <a:rPr lang="nl-NL" dirty="0"/>
-              <a:t>Import all apex apps</a:t>
-            </a:r>
-          </a:p>
-          <a:p>
-            <a:pPr>
+              <a:t>Use case: An app to register running events</a:t>
+            </a:r>
+          </a:p>
+          <a:p>
+            <a:pPr lvl="1">
               <a:lnSpc>
                 <a:spcPct val="100000"/>
               </a:lnSpc>
             </a:pPr>
             <a:r>
-              <a:rPr lang="nl-NL" dirty="0"/>
-              <a:t>Instructions/screenshots</a:t>
-            </a:r>
-          </a:p>
-          <a:p>
-            <a:pPr>
-              <a:lnSpc>
-                <a:spcPct val="100000"/>
-              </a:lnSpc>
-            </a:pPr>
-            <a:r>
-              <a:rPr lang="nl-NL" dirty="0"/>
-              <a:t>Use case: An app to register running events</a:t>
-            </a:r>
+              <a:rPr lang="nl-NL"/>
+              <a:t>View all objects and data (object explorer</a:t>
+            </a:r>
+            <a:endParaRPr lang="nl-NL" dirty="0"/>
           </a:p>
           <a:p>
             <a:pPr marL="0" indent="0">
@@ -5375,7 +5782,7 @@
           <a:p>
             <a:fld id="{D18D76BD-4F27-4DB5-A5CA-922C494401EB}" type="datetime1">
               <a:rPr lang="nl-NL" smtClean="0"/>
-              <a:t>1-12-2019</a:t>
+              <a:t>5-12-2019</a:t>
             </a:fld>
             <a:endParaRPr lang="nl-NL" dirty="0"/>
           </a:p>
@@ -5592,7 +5999,7 @@
           <a:p>
             <a:fld id="{D18D76BD-4F27-4DB5-A5CA-922C494401EB}" type="datetime1">
               <a:rPr lang="nl-NL" smtClean="0"/>
-              <a:t>1-12-2019</a:t>
+              <a:t>5-12-2019</a:t>
             </a:fld>
             <a:endParaRPr lang="nl-NL" dirty="0"/>
           </a:p>
@@ -5812,7 +6219,7 @@
           <a:p>
             <a:fld id="{D18D76BD-4F27-4DB5-A5CA-922C494401EB}" type="datetime1">
               <a:rPr lang="nl-NL" smtClean="0"/>
-              <a:t>1-12-2019</a:t>
+              <a:t>5-12-2019</a:t>
             </a:fld>
             <a:endParaRPr lang="nl-NL" dirty="0"/>
           </a:p>
@@ -6029,7 +6436,7 @@
           <a:p>
             <a:fld id="{D18D76BD-4F27-4DB5-A5CA-922C494401EB}" type="datetime1">
               <a:rPr lang="nl-NL" smtClean="0"/>
-              <a:t>1-12-2019</a:t>
+              <a:t>5-12-2019</a:t>
             </a:fld>
             <a:endParaRPr lang="nl-NL" dirty="0"/>
           </a:p>

</xml_diff>